<commit_message>
have an idea for how to make groups and individuals work for arbitrary inputs, but need to see if this needs to be done before runtime, or if it can be done dynamically. multiple entry test still needs to be verified
</commit_message>
<xml_diff>
--- a/Documents/Lecture outlines/Lecture 1/Lecture 1.pptx
+++ b/Documents/Lecture outlines/Lecture 1/Lecture 1.pptx
@@ -19,15 +19,16 @@
     <p:sldId id="273" r:id="rId13"/>
     <p:sldId id="274" r:id="rId14"/>
     <p:sldId id="275" r:id="rId15"/>
-    <p:sldId id="276" r:id="rId16"/>
-    <p:sldId id="268" r:id="rId17"/>
-    <p:sldId id="261" r:id="rId18"/>
-    <p:sldId id="262" r:id="rId19"/>
-    <p:sldId id="263" r:id="rId20"/>
-    <p:sldId id="264" r:id="rId21"/>
-    <p:sldId id="269" r:id="rId22"/>
-    <p:sldId id="270" r:id="rId23"/>
-    <p:sldId id="271" r:id="rId24"/>
+    <p:sldId id="282" r:id="rId16"/>
+    <p:sldId id="276" r:id="rId17"/>
+    <p:sldId id="268" r:id="rId18"/>
+    <p:sldId id="261" r:id="rId19"/>
+    <p:sldId id="262" r:id="rId20"/>
+    <p:sldId id="263" r:id="rId21"/>
+    <p:sldId id="264" r:id="rId22"/>
+    <p:sldId id="269" r:id="rId23"/>
+    <p:sldId id="270" r:id="rId24"/>
+    <p:sldId id="271" r:id="rId25"/>
   </p:sldIdLst>
   <p:sldSz cx="12192000" cy="6858000"/>
   <p:notesSz cx="6858000" cy="9144000"/>
@@ -283,7 +284,7 @@
           <a:p>
             <a:fld id="{5011DBB3-DD7D-42AC-956E-EDFB65DC89C3}" type="datetimeFigureOut">
               <a:rPr lang="en-GB" smtClean="0"/>
-              <a:t>28/11/2019</a:t>
+              <a:t>02/12/2019</a:t>
             </a:fld>
             <a:endParaRPr lang="en-GB"/>
           </a:p>
@@ -483,7 +484,7 @@
           <a:p>
             <a:fld id="{5011DBB3-DD7D-42AC-956E-EDFB65DC89C3}" type="datetimeFigureOut">
               <a:rPr lang="en-GB" smtClean="0"/>
-              <a:t>28/11/2019</a:t>
+              <a:t>02/12/2019</a:t>
             </a:fld>
             <a:endParaRPr lang="en-GB"/>
           </a:p>
@@ -693,7 +694,7 @@
           <a:p>
             <a:fld id="{5011DBB3-DD7D-42AC-956E-EDFB65DC89C3}" type="datetimeFigureOut">
               <a:rPr lang="en-GB" smtClean="0"/>
-              <a:t>28/11/2019</a:t>
+              <a:t>02/12/2019</a:t>
             </a:fld>
             <a:endParaRPr lang="en-GB"/>
           </a:p>
@@ -893,7 +894,7 @@
           <a:p>
             <a:fld id="{5011DBB3-DD7D-42AC-956E-EDFB65DC89C3}" type="datetimeFigureOut">
               <a:rPr lang="en-GB" smtClean="0"/>
-              <a:t>28/11/2019</a:t>
+              <a:t>02/12/2019</a:t>
             </a:fld>
             <a:endParaRPr lang="en-GB"/>
           </a:p>
@@ -1169,7 +1170,7 @@
           <a:p>
             <a:fld id="{5011DBB3-DD7D-42AC-956E-EDFB65DC89C3}" type="datetimeFigureOut">
               <a:rPr lang="en-GB" smtClean="0"/>
-              <a:t>28/11/2019</a:t>
+              <a:t>02/12/2019</a:t>
             </a:fld>
             <a:endParaRPr lang="en-GB"/>
           </a:p>
@@ -1437,7 +1438,7 @@
           <a:p>
             <a:fld id="{5011DBB3-DD7D-42AC-956E-EDFB65DC89C3}" type="datetimeFigureOut">
               <a:rPr lang="en-GB" smtClean="0"/>
-              <a:t>28/11/2019</a:t>
+              <a:t>02/12/2019</a:t>
             </a:fld>
             <a:endParaRPr lang="en-GB"/>
           </a:p>
@@ -1852,7 +1853,7 @@
           <a:p>
             <a:fld id="{5011DBB3-DD7D-42AC-956E-EDFB65DC89C3}" type="datetimeFigureOut">
               <a:rPr lang="en-GB" smtClean="0"/>
-              <a:t>28/11/2019</a:t>
+              <a:t>02/12/2019</a:t>
             </a:fld>
             <a:endParaRPr lang="en-GB"/>
           </a:p>
@@ -1994,7 +1995,7 @@
           <a:p>
             <a:fld id="{5011DBB3-DD7D-42AC-956E-EDFB65DC89C3}" type="datetimeFigureOut">
               <a:rPr lang="en-GB" smtClean="0"/>
-              <a:t>28/11/2019</a:t>
+              <a:t>02/12/2019</a:t>
             </a:fld>
             <a:endParaRPr lang="en-GB"/>
           </a:p>
@@ -2107,7 +2108,7 @@
           <a:p>
             <a:fld id="{5011DBB3-DD7D-42AC-956E-EDFB65DC89C3}" type="datetimeFigureOut">
               <a:rPr lang="en-GB" smtClean="0"/>
-              <a:t>28/11/2019</a:t>
+              <a:t>02/12/2019</a:t>
             </a:fld>
             <a:endParaRPr lang="en-GB"/>
           </a:p>
@@ -2420,7 +2421,7 @@
           <a:p>
             <a:fld id="{5011DBB3-DD7D-42AC-956E-EDFB65DC89C3}" type="datetimeFigureOut">
               <a:rPr lang="en-GB" smtClean="0"/>
-              <a:t>28/11/2019</a:t>
+              <a:t>02/12/2019</a:t>
             </a:fld>
             <a:endParaRPr lang="en-GB"/>
           </a:p>
@@ -2709,7 +2710,7 @@
           <a:p>
             <a:fld id="{5011DBB3-DD7D-42AC-956E-EDFB65DC89C3}" type="datetimeFigureOut">
               <a:rPr lang="en-GB" smtClean="0"/>
-              <a:t>28/11/2019</a:t>
+              <a:t>02/12/2019</a:t>
             </a:fld>
             <a:endParaRPr lang="en-GB"/>
           </a:p>
@@ -2786,9 +2787,39 @@
 <p:sldMaster xmlns:a="http://schemas.openxmlformats.org/drawingml/2006/main" xmlns:r="http://schemas.openxmlformats.org/officeDocument/2006/relationships" xmlns:p="http://schemas.openxmlformats.org/presentationml/2006/main">
   <p:cSld>
     <p:bg>
-      <p:bgRef idx="1001">
-        <a:schemeClr val="bg1"/>
-      </p:bgRef>
+      <p:bgPr>
+        <a:gradFill flip="none" rotWithShape="1">
+          <a:gsLst>
+            <a:gs pos="0">
+              <a:schemeClr val="accent1">
+                <a:lumMod val="5000"/>
+                <a:lumOff val="95000"/>
+              </a:schemeClr>
+            </a:gs>
+            <a:gs pos="74000">
+              <a:schemeClr val="accent1">
+                <a:lumMod val="45000"/>
+                <a:lumOff val="55000"/>
+              </a:schemeClr>
+            </a:gs>
+            <a:gs pos="83000">
+              <a:schemeClr val="accent1">
+                <a:lumMod val="45000"/>
+                <a:lumOff val="55000"/>
+              </a:schemeClr>
+            </a:gs>
+            <a:gs pos="100000">
+              <a:schemeClr val="accent1">
+                <a:lumMod val="30000"/>
+                <a:lumOff val="70000"/>
+              </a:schemeClr>
+            </a:gs>
+          </a:gsLst>
+          <a:lin ang="5400000" scaled="1"/>
+          <a:tileRect/>
+        </a:gradFill>
+        <a:effectLst/>
+      </p:bgPr>
     </p:bg>
     <p:spTree>
       <p:nvGrpSpPr>
@@ -2952,7 +2983,7 @@
           <a:p>
             <a:fld id="{5011DBB3-DD7D-42AC-956E-EDFB65DC89C3}" type="datetimeFigureOut">
               <a:rPr lang="en-GB" smtClean="0"/>
-              <a:t>28/11/2019</a:t>
+              <a:t>02/12/2019</a:t>
             </a:fld>
             <a:endParaRPr lang="en-GB"/>
           </a:p>
@@ -3560,10 +3591,10 @@
       </p:sp>
       <p:grpSp>
         <p:nvGrpSpPr>
-          <p:cNvPr id="10" name="Group 9">
-            <a:extLst>
-              <a:ext uri="{FF2B5EF4-FFF2-40B4-BE49-F238E27FC236}">
-                <a16:creationId xmlns:a16="http://schemas.microsoft.com/office/drawing/2014/main" id="{F6F13892-E450-45BB-A3D4-B5A84053DFB3}"/>
+          <p:cNvPr id="11" name="Group 10">
+            <a:extLst>
+              <a:ext uri="{FF2B5EF4-FFF2-40B4-BE49-F238E27FC236}">
+                <a16:creationId xmlns:a16="http://schemas.microsoft.com/office/drawing/2014/main" id="{6617BAF7-6DBC-4E8F-983A-0C37C9761732}"/>
               </a:ext>
             </a:extLst>
           </p:cNvPr>
@@ -3580,10 +3611,10 @@
         </p:grpSpPr>
         <p:sp>
           <p:nvSpPr>
-            <p:cNvPr id="4" name="Rectangle 3">
+            <p:cNvPr id="12" name="Rectangle 11">
               <a:extLst>
                 <a:ext uri="{FF2B5EF4-FFF2-40B4-BE49-F238E27FC236}">
-                  <a16:creationId xmlns:a16="http://schemas.microsoft.com/office/drawing/2014/main" id="{F709E8B6-75D7-45EB-90F5-C2725BAAEF24}"/>
+                  <a16:creationId xmlns:a16="http://schemas.microsoft.com/office/drawing/2014/main" id="{635CDF72-D128-46E8-9FB7-2453FBA7AE90}"/>
                 </a:ext>
               </a:extLst>
             </p:cNvPr>
@@ -3629,10 +3660,10 @@
         </p:sp>
         <p:sp>
           <p:nvSpPr>
-            <p:cNvPr id="5" name="Rectangle 4">
+            <p:cNvPr id="13" name="Rectangle 12">
               <a:extLst>
                 <a:ext uri="{FF2B5EF4-FFF2-40B4-BE49-F238E27FC236}">
-                  <a16:creationId xmlns:a16="http://schemas.microsoft.com/office/drawing/2014/main" id="{BA7ABF24-F544-47DA-93E9-C0E779071524}"/>
+                  <a16:creationId xmlns:a16="http://schemas.microsoft.com/office/drawing/2014/main" id="{9D2BD9EE-68A1-4A0F-AEF5-DC4C7EED0AF1}"/>
                 </a:ext>
               </a:extLst>
             </p:cNvPr>
@@ -3678,10 +3709,10 @@
         </p:sp>
         <p:sp>
           <p:nvSpPr>
-            <p:cNvPr id="6" name="Rectangle 5">
+            <p:cNvPr id="14" name="Rectangle 13">
               <a:extLst>
                 <a:ext uri="{FF2B5EF4-FFF2-40B4-BE49-F238E27FC236}">
-                  <a16:creationId xmlns:a16="http://schemas.microsoft.com/office/drawing/2014/main" id="{B03DFA24-990F-41CC-A02F-75D9E382691B}"/>
+                  <a16:creationId xmlns:a16="http://schemas.microsoft.com/office/drawing/2014/main" id="{389200E7-8AAD-4C30-904C-7C808D877EA8}"/>
                 </a:ext>
               </a:extLst>
             </p:cNvPr>
@@ -3727,10 +3758,10 @@
         </p:sp>
         <p:sp>
           <p:nvSpPr>
-            <p:cNvPr id="7" name="Rectangle 6">
+            <p:cNvPr id="15" name="Rectangle 14">
               <a:extLst>
                 <a:ext uri="{FF2B5EF4-FFF2-40B4-BE49-F238E27FC236}">
-                  <a16:creationId xmlns:a16="http://schemas.microsoft.com/office/drawing/2014/main" id="{F93CFFF4-B1E6-4A01-96F0-498CA4B28D3C}"/>
+                  <a16:creationId xmlns:a16="http://schemas.microsoft.com/office/drawing/2014/main" id="{809D87E9-FE83-41CC-BA4B-7907AC58ACF1}"/>
                 </a:ext>
               </a:extLst>
             </p:cNvPr>
@@ -3776,10 +3807,10 @@
         </p:sp>
         <p:sp>
           <p:nvSpPr>
-            <p:cNvPr id="8" name="Oval 7">
+            <p:cNvPr id="16" name="Oval 15">
               <a:extLst>
                 <a:ext uri="{FF2B5EF4-FFF2-40B4-BE49-F238E27FC236}">
-                  <a16:creationId xmlns:a16="http://schemas.microsoft.com/office/drawing/2014/main" id="{F77A68F9-C2EE-46F5-9AEB-DDA3AB5C8371}"/>
+                  <a16:creationId xmlns:a16="http://schemas.microsoft.com/office/drawing/2014/main" id="{C1F5524E-E8D3-45DF-995C-24347ECEE271}"/>
                 </a:ext>
               </a:extLst>
             </p:cNvPr>
@@ -3825,10 +3856,10 @@
         </p:sp>
         <p:sp>
           <p:nvSpPr>
-            <p:cNvPr id="9" name="Oval 8">
+            <p:cNvPr id="17" name="Oval 16">
               <a:extLst>
                 <a:ext uri="{FF2B5EF4-FFF2-40B4-BE49-F238E27FC236}">
-                  <a16:creationId xmlns:a16="http://schemas.microsoft.com/office/drawing/2014/main" id="{6005EC8A-8FC2-4172-A4C2-60B68F0ACBF1}"/>
+                  <a16:creationId xmlns:a16="http://schemas.microsoft.com/office/drawing/2014/main" id="{BBAFAC40-DA71-49DC-A657-08CCC5A88E14}"/>
                 </a:ext>
               </a:extLst>
             </p:cNvPr>
@@ -3837,7 +3868,7 @@
           </p:nvSpPr>
           <p:spPr>
             <a:xfrm>
-              <a:off x="1944414" y="3216163"/>
+              <a:off x="1953348" y="3190037"/>
               <a:ext cx="1555706" cy="1145628"/>
             </a:xfrm>
             <a:prstGeom prst="ellipse">
@@ -3868,7 +3899,7 @@
             <a:lstStyle/>
             <a:p>
               <a:pPr algn="ctr"/>
-              <a:endParaRPr lang="en-GB"/>
+              <a:endParaRPr lang="en-GB" dirty="0"/>
             </a:p>
           </p:txBody>
         </p:sp>
@@ -4002,10 +4033,10 @@
       </p:sp>
       <p:grpSp>
         <p:nvGrpSpPr>
-          <p:cNvPr id="13" name="Group 12">
-            <a:extLst>
-              <a:ext uri="{FF2B5EF4-FFF2-40B4-BE49-F238E27FC236}">
-                <a16:creationId xmlns:a16="http://schemas.microsoft.com/office/drawing/2014/main" id="{64C8003D-3190-40C5-A1BE-60E1763A5880}"/>
+          <p:cNvPr id="12" name="Group 11">
+            <a:extLst>
+              <a:ext uri="{FF2B5EF4-FFF2-40B4-BE49-F238E27FC236}">
+                <a16:creationId xmlns:a16="http://schemas.microsoft.com/office/drawing/2014/main" id="{DF5D5368-A5DE-4952-9227-FCC876F6A37B}"/>
               </a:ext>
             </a:extLst>
           </p:cNvPr>
@@ -4014,18 +4045,18 @@
         </p:nvGrpSpPr>
         <p:grpSpPr>
           <a:xfrm>
-            <a:off x="1609835" y="2636215"/>
+            <a:off x="1651876" y="2606566"/>
             <a:ext cx="9936480" cy="1402080"/>
-            <a:chOff x="1609835" y="2636215"/>
+            <a:chOff x="1778000" y="3048000"/>
             <a:chExt cx="9936480" cy="1402080"/>
           </a:xfrm>
         </p:grpSpPr>
         <p:sp>
           <p:nvSpPr>
-            <p:cNvPr id="4" name="Rectangle 3">
+            <p:cNvPr id="14" name="Rectangle 13">
               <a:extLst>
                 <a:ext uri="{FF2B5EF4-FFF2-40B4-BE49-F238E27FC236}">
-                  <a16:creationId xmlns:a16="http://schemas.microsoft.com/office/drawing/2014/main" id="{F709E8B6-75D7-45EB-90F5-C2725BAAEF24}"/>
+                  <a16:creationId xmlns:a16="http://schemas.microsoft.com/office/drawing/2014/main" id="{5915C284-3717-450B-B732-A521EC6CEEF7}"/>
                 </a:ext>
               </a:extLst>
             </p:cNvPr>
@@ -4034,7 +4065,7 @@
           </p:nvSpPr>
           <p:spPr>
             <a:xfrm>
-              <a:off x="1609835" y="2636215"/>
+              <a:off x="1778000" y="3048000"/>
               <a:ext cx="1828800" cy="1402080"/>
             </a:xfrm>
             <a:prstGeom prst="rect">
@@ -4071,10 +4102,10 @@
         </p:sp>
         <p:sp>
           <p:nvSpPr>
-            <p:cNvPr id="5" name="Rectangle 4">
+            <p:cNvPr id="15" name="Rectangle 14">
               <a:extLst>
                 <a:ext uri="{FF2B5EF4-FFF2-40B4-BE49-F238E27FC236}">
-                  <a16:creationId xmlns:a16="http://schemas.microsoft.com/office/drawing/2014/main" id="{BA7ABF24-F544-47DA-93E9-C0E779071524}"/>
+                  <a16:creationId xmlns:a16="http://schemas.microsoft.com/office/drawing/2014/main" id="{43A0E595-45E2-42FD-9880-6A20528C6AA0}"/>
                 </a:ext>
               </a:extLst>
             </p:cNvPr>
@@ -4083,7 +4114,7 @@
           </p:nvSpPr>
           <p:spPr>
             <a:xfrm>
-              <a:off x="3438635" y="3113735"/>
+              <a:off x="3606800" y="3525520"/>
               <a:ext cx="3302000" cy="487680"/>
             </a:xfrm>
             <a:prstGeom prst="rect">
@@ -4120,10 +4151,10 @@
         </p:sp>
         <p:sp>
           <p:nvSpPr>
-            <p:cNvPr id="6" name="Rectangle 5">
+            <p:cNvPr id="16" name="Rectangle 15">
               <a:extLst>
                 <a:ext uri="{FF2B5EF4-FFF2-40B4-BE49-F238E27FC236}">
-                  <a16:creationId xmlns:a16="http://schemas.microsoft.com/office/drawing/2014/main" id="{B03DFA24-990F-41CC-A02F-75D9E382691B}"/>
+                  <a16:creationId xmlns:a16="http://schemas.microsoft.com/office/drawing/2014/main" id="{94D69086-6474-452F-9135-315632A3DDF6}"/>
                 </a:ext>
               </a:extLst>
             </p:cNvPr>
@@ -4132,7 +4163,7 @@
           </p:nvSpPr>
           <p:spPr>
             <a:xfrm>
-              <a:off x="6740635" y="2636215"/>
+              <a:off x="6908800" y="3048000"/>
               <a:ext cx="4185920" cy="1402080"/>
             </a:xfrm>
             <a:prstGeom prst="rect">
@@ -4169,10 +4200,10 @@
         </p:sp>
         <p:sp>
           <p:nvSpPr>
-            <p:cNvPr id="7" name="Rectangle 6">
+            <p:cNvPr id="17" name="Rectangle 16">
               <a:extLst>
                 <a:ext uri="{FF2B5EF4-FFF2-40B4-BE49-F238E27FC236}">
-                  <a16:creationId xmlns:a16="http://schemas.microsoft.com/office/drawing/2014/main" id="{F93CFFF4-B1E6-4A01-96F0-498CA4B28D3C}"/>
+                  <a16:creationId xmlns:a16="http://schemas.microsoft.com/office/drawing/2014/main" id="{3ECD4DBA-9814-490E-B12E-02F645FA721F}"/>
                 </a:ext>
               </a:extLst>
             </p:cNvPr>
@@ -4181,7 +4212,7 @@
           </p:nvSpPr>
           <p:spPr>
             <a:xfrm>
-              <a:off x="10926555" y="3017215"/>
+              <a:off x="11094720" y="3429000"/>
               <a:ext cx="619760" cy="482600"/>
             </a:xfrm>
             <a:prstGeom prst="rect">
@@ -4218,10 +4249,10 @@
         </p:sp>
         <p:sp>
           <p:nvSpPr>
-            <p:cNvPr id="8" name="Oval 7">
+            <p:cNvPr id="18" name="Oval 17">
               <a:extLst>
                 <a:ext uri="{FF2B5EF4-FFF2-40B4-BE49-F238E27FC236}">
-                  <a16:creationId xmlns:a16="http://schemas.microsoft.com/office/drawing/2014/main" id="{F77A68F9-C2EE-46F5-9AEB-DDA3AB5C8371}"/>
+                  <a16:creationId xmlns:a16="http://schemas.microsoft.com/office/drawing/2014/main" id="{5552E63A-3831-441F-8A90-83A4D7823C03}"/>
                 </a:ext>
               </a:extLst>
             </p:cNvPr>
@@ -4230,7 +4261,7 @@
           </p:nvSpPr>
           <p:spPr>
             <a:xfrm>
-              <a:off x="11185635" y="3314078"/>
+              <a:off x="11353800" y="3725863"/>
               <a:ext cx="106680" cy="73977"/>
             </a:xfrm>
             <a:prstGeom prst="ellipse">
@@ -4267,10 +4298,10 @@
         </p:sp>
         <p:sp>
           <p:nvSpPr>
-            <p:cNvPr id="11" name="Oval 10">
+            <p:cNvPr id="19" name="Oval 18">
               <a:extLst>
                 <a:ext uri="{FF2B5EF4-FFF2-40B4-BE49-F238E27FC236}">
-                  <a16:creationId xmlns:a16="http://schemas.microsoft.com/office/drawing/2014/main" id="{CB2D9ECC-A9FC-4CBF-A29D-13993DAD4665}"/>
+                  <a16:creationId xmlns:a16="http://schemas.microsoft.com/office/drawing/2014/main" id="{03A160EC-FB3E-4728-8987-22CE89E21A99}"/>
                 </a:ext>
               </a:extLst>
             </p:cNvPr>
@@ -4279,57 +4310,8 @@
           </p:nvSpPr>
           <p:spPr>
             <a:xfrm>
-              <a:off x="2729014" y="3193465"/>
-              <a:ext cx="2521430" cy="306350"/>
-            </a:xfrm>
-            <a:prstGeom prst="ellipse">
-              <a:avLst/>
-            </a:prstGeom>
-            <a:solidFill>
-              <a:srgbClr val="FF0000"/>
-            </a:solidFill>
-          </p:spPr>
-          <p:style>
-            <a:lnRef idx="2">
-              <a:schemeClr val="accent1">
-                <a:shade val="50000"/>
-              </a:schemeClr>
-            </a:lnRef>
-            <a:fillRef idx="1">
-              <a:schemeClr val="accent1"/>
-            </a:fillRef>
-            <a:effectRef idx="0">
-              <a:schemeClr val="accent1"/>
-            </a:effectRef>
-            <a:fontRef idx="minor">
-              <a:schemeClr val="lt1"/>
-            </a:fontRef>
-          </p:style>
-          <p:txBody>
-            <a:bodyPr rtlCol="0" anchor="ctr"/>
-            <a:lstStyle/>
-            <a:p>
-              <a:pPr algn="ctr"/>
-              <a:endParaRPr lang="en-GB"/>
-            </a:p>
-          </p:txBody>
-        </p:sp>
-        <p:sp>
-          <p:nvSpPr>
-            <p:cNvPr id="9" name="Oval 8">
-              <a:extLst>
-                <a:ext uri="{FF2B5EF4-FFF2-40B4-BE49-F238E27FC236}">
-                  <a16:creationId xmlns:a16="http://schemas.microsoft.com/office/drawing/2014/main" id="{6005EC8A-8FC2-4172-A4C2-60B68F0ACBF1}"/>
-                </a:ext>
-              </a:extLst>
-            </p:cNvPr>
-            <p:cNvSpPr/>
-            <p:nvPr/>
-          </p:nvSpPr>
-          <p:spPr>
-            <a:xfrm>
-              <a:off x="2160929" y="2895077"/>
-              <a:ext cx="1308450" cy="943654"/>
+              <a:off x="2168372" y="3196546"/>
+              <a:ext cx="1555706" cy="1145628"/>
             </a:xfrm>
             <a:prstGeom prst="ellipse">
               <a:avLst/>
@@ -4364,6 +4346,55 @@
           </p:txBody>
         </p:sp>
       </p:grpSp>
+      <p:sp>
+        <p:nvSpPr>
+          <p:cNvPr id="20" name="Oval 19">
+            <a:extLst>
+              <a:ext uri="{FF2B5EF4-FFF2-40B4-BE49-F238E27FC236}">
+                <a16:creationId xmlns:a16="http://schemas.microsoft.com/office/drawing/2014/main" id="{399332BE-0E8D-43EF-96A9-3F14FDA5CB91}"/>
+              </a:ext>
+            </a:extLst>
+          </p:cNvPr>
+          <p:cNvSpPr/>
+          <p:nvPr/>
+        </p:nvSpPr>
+        <p:spPr>
+          <a:xfrm>
+            <a:off x="2995317" y="3140376"/>
+            <a:ext cx="1355922" cy="362082"/>
+          </a:xfrm>
+          <a:prstGeom prst="ellipse">
+            <a:avLst/>
+          </a:prstGeom>
+          <a:solidFill>
+            <a:srgbClr val="FF0000"/>
+          </a:solidFill>
+        </p:spPr>
+        <p:style>
+          <a:lnRef idx="2">
+            <a:schemeClr val="accent1">
+              <a:shade val="50000"/>
+            </a:schemeClr>
+          </a:lnRef>
+          <a:fillRef idx="1">
+            <a:schemeClr val="accent1"/>
+          </a:fillRef>
+          <a:effectRef idx="0">
+            <a:schemeClr val="accent1"/>
+          </a:effectRef>
+          <a:fontRef idx="minor">
+            <a:schemeClr val="lt1"/>
+          </a:fontRef>
+        </p:style>
+        <p:txBody>
+          <a:bodyPr rtlCol="0" anchor="ctr"/>
+          <a:lstStyle/>
+          <a:p>
+            <a:pPr algn="ctr"/>
+            <a:endParaRPr lang="en-GB" dirty="0"/>
+          </a:p>
+        </p:txBody>
+      </p:sp>
     </p:spTree>
     <p:extLst>
       <p:ext uri="{BB962C8B-B14F-4D97-AF65-F5344CB8AC3E}">
@@ -5426,10 +5457,10 @@
       </p:sp>
       <p:grpSp>
         <p:nvGrpSpPr>
-          <p:cNvPr id="10" name="Group 9">
-            <a:extLst>
-              <a:ext uri="{FF2B5EF4-FFF2-40B4-BE49-F238E27FC236}">
-                <a16:creationId xmlns:a16="http://schemas.microsoft.com/office/drawing/2014/main" id="{F6F13892-E450-45BB-A3D4-B5A84053DFB3}"/>
+          <p:cNvPr id="11" name="Group 10">
+            <a:extLst>
+              <a:ext uri="{FF2B5EF4-FFF2-40B4-BE49-F238E27FC236}">
+                <a16:creationId xmlns:a16="http://schemas.microsoft.com/office/drawing/2014/main" id="{9E23AAEA-9F6B-4EAF-9293-A27089FBC45A}"/>
               </a:ext>
             </a:extLst>
           </p:cNvPr>
@@ -5438,7 +5469,7 @@
         </p:nvGrpSpPr>
         <p:grpSpPr>
           <a:xfrm>
-            <a:off x="1127760" y="2727960"/>
+            <a:off x="1651876" y="2606566"/>
             <a:ext cx="9936480" cy="1402080"/>
             <a:chOff x="1778000" y="3048000"/>
             <a:chExt cx="9936480" cy="1402080"/>
@@ -5446,10 +5477,10 @@
         </p:grpSpPr>
         <p:sp>
           <p:nvSpPr>
-            <p:cNvPr id="4" name="Rectangle 3">
+            <p:cNvPr id="12" name="Rectangle 11">
               <a:extLst>
                 <a:ext uri="{FF2B5EF4-FFF2-40B4-BE49-F238E27FC236}">
-                  <a16:creationId xmlns:a16="http://schemas.microsoft.com/office/drawing/2014/main" id="{F709E8B6-75D7-45EB-90F5-C2725BAAEF24}"/>
+                  <a16:creationId xmlns:a16="http://schemas.microsoft.com/office/drawing/2014/main" id="{BAFF4768-0B33-4FE6-A993-A5D459AB1A2D}"/>
                 </a:ext>
               </a:extLst>
             </p:cNvPr>
@@ -5495,10 +5526,10 @@
         </p:sp>
         <p:sp>
           <p:nvSpPr>
-            <p:cNvPr id="5" name="Rectangle 4">
+            <p:cNvPr id="13" name="Rectangle 12">
               <a:extLst>
                 <a:ext uri="{FF2B5EF4-FFF2-40B4-BE49-F238E27FC236}">
-                  <a16:creationId xmlns:a16="http://schemas.microsoft.com/office/drawing/2014/main" id="{BA7ABF24-F544-47DA-93E9-C0E779071524}"/>
+                  <a16:creationId xmlns:a16="http://schemas.microsoft.com/office/drawing/2014/main" id="{0F8C44DD-E71D-4F1B-9C13-3502E152B6BF}"/>
                 </a:ext>
               </a:extLst>
             </p:cNvPr>
@@ -5544,10 +5575,10 @@
         </p:sp>
         <p:sp>
           <p:nvSpPr>
-            <p:cNvPr id="6" name="Rectangle 5">
+            <p:cNvPr id="14" name="Rectangle 13">
               <a:extLst>
                 <a:ext uri="{FF2B5EF4-FFF2-40B4-BE49-F238E27FC236}">
-                  <a16:creationId xmlns:a16="http://schemas.microsoft.com/office/drawing/2014/main" id="{B03DFA24-990F-41CC-A02F-75D9E382691B}"/>
+                  <a16:creationId xmlns:a16="http://schemas.microsoft.com/office/drawing/2014/main" id="{E5E16676-C38A-4D5F-837E-9FDEE5E390D6}"/>
                 </a:ext>
               </a:extLst>
             </p:cNvPr>
@@ -5593,10 +5624,10 @@
         </p:sp>
         <p:sp>
           <p:nvSpPr>
-            <p:cNvPr id="7" name="Rectangle 6">
+            <p:cNvPr id="15" name="Rectangle 14">
               <a:extLst>
                 <a:ext uri="{FF2B5EF4-FFF2-40B4-BE49-F238E27FC236}">
-                  <a16:creationId xmlns:a16="http://schemas.microsoft.com/office/drawing/2014/main" id="{F93CFFF4-B1E6-4A01-96F0-498CA4B28D3C}"/>
+                  <a16:creationId xmlns:a16="http://schemas.microsoft.com/office/drawing/2014/main" id="{15229E40-8307-4A89-BDD7-1F80D9EC8FB7}"/>
                 </a:ext>
               </a:extLst>
             </p:cNvPr>
@@ -5642,10 +5673,10 @@
         </p:sp>
         <p:sp>
           <p:nvSpPr>
-            <p:cNvPr id="8" name="Oval 7">
+            <p:cNvPr id="16" name="Oval 15">
               <a:extLst>
                 <a:ext uri="{FF2B5EF4-FFF2-40B4-BE49-F238E27FC236}">
-                  <a16:creationId xmlns:a16="http://schemas.microsoft.com/office/drawing/2014/main" id="{F77A68F9-C2EE-46F5-9AEB-DDA3AB5C8371}"/>
+                  <a16:creationId xmlns:a16="http://schemas.microsoft.com/office/drawing/2014/main" id="{97E761DC-4D6C-48CB-B8F2-E6EE020BBB5A}"/>
                 </a:ext>
               </a:extLst>
             </p:cNvPr>
@@ -5691,10 +5722,10 @@
         </p:sp>
         <p:sp>
           <p:nvSpPr>
-            <p:cNvPr id="9" name="Oval 8">
+            <p:cNvPr id="17" name="Oval 16">
               <a:extLst>
                 <a:ext uri="{FF2B5EF4-FFF2-40B4-BE49-F238E27FC236}">
-                  <a16:creationId xmlns:a16="http://schemas.microsoft.com/office/drawing/2014/main" id="{6005EC8A-8FC2-4172-A4C2-60B68F0ACBF1}"/>
+                  <a16:creationId xmlns:a16="http://schemas.microsoft.com/office/drawing/2014/main" id="{67ACBAB4-321B-4DE1-922A-CF9844DD36D1}"/>
                 </a:ext>
               </a:extLst>
             </p:cNvPr>
@@ -5703,7 +5734,7 @@
           </p:nvSpPr>
           <p:spPr>
             <a:xfrm>
-              <a:off x="9539014" y="3112469"/>
+              <a:off x="7792720" y="3227026"/>
               <a:ext cx="1555706" cy="1145628"/>
             </a:xfrm>
             <a:prstGeom prst="ellipse">
@@ -5774,6 +5805,448 @@
           <p:cNvPr id="2" name="Title 1">
             <a:extLst>
               <a:ext uri="{FF2B5EF4-FFF2-40B4-BE49-F238E27FC236}">
+                <a16:creationId xmlns:a16="http://schemas.microsoft.com/office/drawing/2014/main" id="{7526AA52-CFF5-42B6-AE00-50F412B99E8A}"/>
+              </a:ext>
+            </a:extLst>
+          </p:cNvPr>
+          <p:cNvSpPr>
+            <a:spLocks noGrp="1"/>
+          </p:cNvSpPr>
+          <p:nvPr>
+            <p:ph type="title"/>
+          </p:nvPr>
+        </p:nvSpPr>
+        <p:spPr/>
+        <p:txBody>
+          <a:bodyPr/>
+          <a:lstStyle/>
+          <a:p>
+            <a:r>
+              <a:rPr lang="en-GB" dirty="0"/>
+              <a:t>Hydraulic model: introduction</a:t>
+            </a:r>
+          </a:p>
+        </p:txBody>
+      </p:sp>
+      <p:sp>
+        <p:nvSpPr>
+          <p:cNvPr id="3" name="Content Placeholder 2">
+            <a:extLst>
+              <a:ext uri="{FF2B5EF4-FFF2-40B4-BE49-F238E27FC236}">
+                <a16:creationId xmlns:a16="http://schemas.microsoft.com/office/drawing/2014/main" id="{29718303-3AB3-4128-8D37-58CF61A280CC}"/>
+              </a:ext>
+            </a:extLst>
+          </p:cNvPr>
+          <p:cNvSpPr>
+            <a:spLocks noGrp="1"/>
+          </p:cNvSpPr>
+          <p:nvPr>
+            <p:ph idx="1"/>
+          </p:nvPr>
+        </p:nvSpPr>
+        <p:spPr/>
+        <p:txBody>
+          <a:bodyPr>
+            <a:normAutofit fontScale="92500" lnSpcReduction="20000"/>
+          </a:bodyPr>
+          <a:lstStyle/>
+          <a:p>
+            <a:r>
+              <a:rPr lang="en-GB" dirty="0"/>
+              <a:t>Elements and transitions</a:t>
+            </a:r>
+          </a:p>
+          <a:p>
+            <a:endParaRPr lang="en-GB" dirty="0"/>
+          </a:p>
+          <a:p>
+            <a:endParaRPr lang="en-GB" dirty="0"/>
+          </a:p>
+          <a:p>
+            <a:endParaRPr lang="en-GB" dirty="0"/>
+          </a:p>
+          <a:p>
+            <a:endParaRPr lang="en-GB" dirty="0"/>
+          </a:p>
+          <a:p>
+            <a:endParaRPr lang="en-GB" dirty="0"/>
+          </a:p>
+          <a:p>
+            <a:r>
+              <a:rPr lang="en-GB" dirty="0"/>
+              <a:t>Solve a quadratic in density either side of a transition</a:t>
+            </a:r>
+          </a:p>
+          <a:p>
+            <a:r>
+              <a:rPr lang="en-GB" dirty="0"/>
+              <a:t>Use that density to solve for speed and flow rate.</a:t>
+            </a:r>
+          </a:p>
+          <a:p>
+            <a:r>
+              <a:rPr lang="en-GB" dirty="0"/>
+              <a:t>That informs time taken for traversal</a:t>
+            </a:r>
+          </a:p>
+          <a:p>
+            <a:r>
+              <a:rPr lang="en-GB" dirty="0"/>
+              <a:t>Finally, add up all the times taken to evacuate</a:t>
+            </a:r>
+          </a:p>
+        </p:txBody>
+      </p:sp>
+      <p:grpSp>
+        <p:nvGrpSpPr>
+          <p:cNvPr id="11" name="Group 10">
+            <a:extLst>
+              <a:ext uri="{FF2B5EF4-FFF2-40B4-BE49-F238E27FC236}">
+                <a16:creationId xmlns:a16="http://schemas.microsoft.com/office/drawing/2014/main" id="{9E23AAEA-9F6B-4EAF-9293-A27089FBC45A}"/>
+              </a:ext>
+            </a:extLst>
+          </p:cNvPr>
+          <p:cNvGrpSpPr/>
+          <p:nvPr/>
+        </p:nvGrpSpPr>
+        <p:grpSpPr>
+          <a:xfrm>
+            <a:off x="1651876" y="2606566"/>
+            <a:ext cx="9936480" cy="1402080"/>
+            <a:chOff x="1778000" y="3048000"/>
+            <a:chExt cx="9936480" cy="1402080"/>
+          </a:xfrm>
+        </p:grpSpPr>
+        <p:sp>
+          <p:nvSpPr>
+            <p:cNvPr id="12" name="Rectangle 11">
+              <a:extLst>
+                <a:ext uri="{FF2B5EF4-FFF2-40B4-BE49-F238E27FC236}">
+                  <a16:creationId xmlns:a16="http://schemas.microsoft.com/office/drawing/2014/main" id="{BAFF4768-0B33-4FE6-A993-A5D459AB1A2D}"/>
+                </a:ext>
+              </a:extLst>
+            </p:cNvPr>
+            <p:cNvSpPr/>
+            <p:nvPr/>
+          </p:nvSpPr>
+          <p:spPr>
+            <a:xfrm>
+              <a:off x="1778000" y="3048000"/>
+              <a:ext cx="1828800" cy="1402080"/>
+            </a:xfrm>
+            <a:prstGeom prst="rect">
+              <a:avLst/>
+            </a:prstGeom>
+            <a:solidFill>
+              <a:schemeClr val="bg1"/>
+            </a:solidFill>
+          </p:spPr>
+          <p:style>
+            <a:lnRef idx="2">
+              <a:schemeClr val="accent1">
+                <a:shade val="50000"/>
+              </a:schemeClr>
+            </a:lnRef>
+            <a:fillRef idx="1">
+              <a:schemeClr val="accent1"/>
+            </a:fillRef>
+            <a:effectRef idx="0">
+              <a:schemeClr val="accent1"/>
+            </a:effectRef>
+            <a:fontRef idx="minor">
+              <a:schemeClr val="lt1"/>
+            </a:fontRef>
+          </p:style>
+          <p:txBody>
+            <a:bodyPr rtlCol="0" anchor="ctr"/>
+            <a:lstStyle/>
+            <a:p>
+              <a:pPr algn="ctr"/>
+              <a:endParaRPr lang="en-GB"/>
+            </a:p>
+          </p:txBody>
+        </p:sp>
+        <p:sp>
+          <p:nvSpPr>
+            <p:cNvPr id="13" name="Rectangle 12">
+              <a:extLst>
+                <a:ext uri="{FF2B5EF4-FFF2-40B4-BE49-F238E27FC236}">
+                  <a16:creationId xmlns:a16="http://schemas.microsoft.com/office/drawing/2014/main" id="{0F8C44DD-E71D-4F1B-9C13-3502E152B6BF}"/>
+                </a:ext>
+              </a:extLst>
+            </p:cNvPr>
+            <p:cNvSpPr/>
+            <p:nvPr/>
+          </p:nvSpPr>
+          <p:spPr>
+            <a:xfrm>
+              <a:off x="3606800" y="3525520"/>
+              <a:ext cx="3302000" cy="487680"/>
+            </a:xfrm>
+            <a:prstGeom prst="rect">
+              <a:avLst/>
+            </a:prstGeom>
+            <a:solidFill>
+              <a:schemeClr val="bg1"/>
+            </a:solidFill>
+          </p:spPr>
+          <p:style>
+            <a:lnRef idx="2">
+              <a:schemeClr val="accent1">
+                <a:shade val="50000"/>
+              </a:schemeClr>
+            </a:lnRef>
+            <a:fillRef idx="1">
+              <a:schemeClr val="accent1"/>
+            </a:fillRef>
+            <a:effectRef idx="0">
+              <a:schemeClr val="accent1"/>
+            </a:effectRef>
+            <a:fontRef idx="minor">
+              <a:schemeClr val="lt1"/>
+            </a:fontRef>
+          </p:style>
+          <p:txBody>
+            <a:bodyPr rtlCol="0" anchor="ctr"/>
+            <a:lstStyle/>
+            <a:p>
+              <a:pPr algn="ctr"/>
+              <a:endParaRPr lang="en-GB"/>
+            </a:p>
+          </p:txBody>
+        </p:sp>
+        <p:sp>
+          <p:nvSpPr>
+            <p:cNvPr id="14" name="Rectangle 13">
+              <a:extLst>
+                <a:ext uri="{FF2B5EF4-FFF2-40B4-BE49-F238E27FC236}">
+                  <a16:creationId xmlns:a16="http://schemas.microsoft.com/office/drawing/2014/main" id="{E5E16676-C38A-4D5F-837E-9FDEE5E390D6}"/>
+                </a:ext>
+              </a:extLst>
+            </p:cNvPr>
+            <p:cNvSpPr/>
+            <p:nvPr/>
+          </p:nvSpPr>
+          <p:spPr>
+            <a:xfrm>
+              <a:off x="6908800" y="3048000"/>
+              <a:ext cx="4185920" cy="1402080"/>
+            </a:xfrm>
+            <a:prstGeom prst="rect">
+              <a:avLst/>
+            </a:prstGeom>
+            <a:solidFill>
+              <a:schemeClr val="bg1"/>
+            </a:solidFill>
+          </p:spPr>
+          <p:style>
+            <a:lnRef idx="2">
+              <a:schemeClr val="accent1">
+                <a:shade val="50000"/>
+              </a:schemeClr>
+            </a:lnRef>
+            <a:fillRef idx="1">
+              <a:schemeClr val="accent1"/>
+            </a:fillRef>
+            <a:effectRef idx="0">
+              <a:schemeClr val="accent1"/>
+            </a:effectRef>
+            <a:fontRef idx="minor">
+              <a:schemeClr val="lt1"/>
+            </a:fontRef>
+          </p:style>
+          <p:txBody>
+            <a:bodyPr rtlCol="0" anchor="ctr"/>
+            <a:lstStyle/>
+            <a:p>
+              <a:pPr algn="ctr"/>
+              <a:endParaRPr lang="en-GB"/>
+            </a:p>
+          </p:txBody>
+        </p:sp>
+        <p:sp>
+          <p:nvSpPr>
+            <p:cNvPr id="15" name="Rectangle 14">
+              <a:extLst>
+                <a:ext uri="{FF2B5EF4-FFF2-40B4-BE49-F238E27FC236}">
+                  <a16:creationId xmlns:a16="http://schemas.microsoft.com/office/drawing/2014/main" id="{15229E40-8307-4A89-BDD7-1F80D9EC8FB7}"/>
+                </a:ext>
+              </a:extLst>
+            </p:cNvPr>
+            <p:cNvSpPr/>
+            <p:nvPr/>
+          </p:nvSpPr>
+          <p:spPr>
+            <a:xfrm>
+              <a:off x="11094720" y="3429000"/>
+              <a:ext cx="619760" cy="482600"/>
+            </a:xfrm>
+            <a:prstGeom prst="rect">
+              <a:avLst/>
+            </a:prstGeom>
+            <a:solidFill>
+              <a:schemeClr val="tx1"/>
+            </a:solidFill>
+          </p:spPr>
+          <p:style>
+            <a:lnRef idx="2">
+              <a:schemeClr val="accent1">
+                <a:shade val="50000"/>
+              </a:schemeClr>
+            </a:lnRef>
+            <a:fillRef idx="1">
+              <a:schemeClr val="accent1"/>
+            </a:fillRef>
+            <a:effectRef idx="0">
+              <a:schemeClr val="accent1"/>
+            </a:effectRef>
+            <a:fontRef idx="minor">
+              <a:schemeClr val="lt1"/>
+            </a:fontRef>
+          </p:style>
+          <p:txBody>
+            <a:bodyPr rtlCol="0" anchor="ctr"/>
+            <a:lstStyle/>
+            <a:p>
+              <a:pPr algn="ctr"/>
+              <a:endParaRPr lang="en-GB"/>
+            </a:p>
+          </p:txBody>
+        </p:sp>
+        <p:sp>
+          <p:nvSpPr>
+            <p:cNvPr id="16" name="Oval 15">
+              <a:extLst>
+                <a:ext uri="{FF2B5EF4-FFF2-40B4-BE49-F238E27FC236}">
+                  <a16:creationId xmlns:a16="http://schemas.microsoft.com/office/drawing/2014/main" id="{97E761DC-4D6C-48CB-B8F2-E6EE020BBB5A}"/>
+                </a:ext>
+              </a:extLst>
+            </p:cNvPr>
+            <p:cNvSpPr/>
+            <p:nvPr/>
+          </p:nvSpPr>
+          <p:spPr>
+            <a:xfrm>
+              <a:off x="11353800" y="3725863"/>
+              <a:ext cx="106680" cy="73977"/>
+            </a:xfrm>
+            <a:prstGeom prst="ellipse">
+              <a:avLst/>
+            </a:prstGeom>
+            <a:solidFill>
+              <a:schemeClr val="bg1"/>
+            </a:solidFill>
+          </p:spPr>
+          <p:style>
+            <a:lnRef idx="2">
+              <a:schemeClr val="accent1">
+                <a:shade val="50000"/>
+              </a:schemeClr>
+            </a:lnRef>
+            <a:fillRef idx="1">
+              <a:schemeClr val="accent1"/>
+            </a:fillRef>
+            <a:effectRef idx="0">
+              <a:schemeClr val="accent1"/>
+            </a:effectRef>
+            <a:fontRef idx="minor">
+              <a:schemeClr val="lt1"/>
+            </a:fontRef>
+          </p:style>
+          <p:txBody>
+            <a:bodyPr rtlCol="0" anchor="ctr"/>
+            <a:lstStyle/>
+            <a:p>
+              <a:pPr algn="ctr"/>
+              <a:endParaRPr lang="en-GB"/>
+            </a:p>
+          </p:txBody>
+        </p:sp>
+        <p:sp>
+          <p:nvSpPr>
+            <p:cNvPr id="17" name="Oval 16">
+              <a:extLst>
+                <a:ext uri="{FF2B5EF4-FFF2-40B4-BE49-F238E27FC236}">
+                  <a16:creationId xmlns:a16="http://schemas.microsoft.com/office/drawing/2014/main" id="{67ACBAB4-321B-4DE1-922A-CF9844DD36D1}"/>
+                </a:ext>
+              </a:extLst>
+            </p:cNvPr>
+            <p:cNvSpPr/>
+            <p:nvPr/>
+          </p:nvSpPr>
+          <p:spPr>
+            <a:xfrm>
+              <a:off x="9432947" y="3227026"/>
+              <a:ext cx="1555706" cy="1145628"/>
+            </a:xfrm>
+            <a:prstGeom prst="ellipse">
+              <a:avLst/>
+            </a:prstGeom>
+            <a:solidFill>
+              <a:srgbClr val="FF0000"/>
+            </a:solidFill>
+          </p:spPr>
+          <p:style>
+            <a:lnRef idx="2">
+              <a:schemeClr val="accent1">
+                <a:shade val="50000"/>
+              </a:schemeClr>
+            </a:lnRef>
+            <a:fillRef idx="1">
+              <a:schemeClr val="accent1"/>
+            </a:fillRef>
+            <a:effectRef idx="0">
+              <a:schemeClr val="accent1"/>
+            </a:effectRef>
+            <a:fontRef idx="minor">
+              <a:schemeClr val="lt1"/>
+            </a:fontRef>
+          </p:style>
+          <p:txBody>
+            <a:bodyPr rtlCol="0" anchor="ctr"/>
+            <a:lstStyle/>
+            <a:p>
+              <a:pPr algn="ctr"/>
+              <a:endParaRPr lang="en-GB" dirty="0"/>
+            </a:p>
+          </p:txBody>
+        </p:sp>
+      </p:grpSp>
+    </p:spTree>
+    <p:extLst>
+      <p:ext uri="{BB962C8B-B14F-4D97-AF65-F5344CB8AC3E}">
+        <p14:creationId xmlns:p14="http://schemas.microsoft.com/office/powerpoint/2010/main" val="4050154869"/>
+      </p:ext>
+    </p:extLst>
+  </p:cSld>
+  <p:clrMapOvr>
+    <a:masterClrMapping/>
+  </p:clrMapOvr>
+</p:sld>
+</file>
+
+<file path=ppt/slides/slide16.xml><?xml version="1.0" encoding="utf-8"?>
+<p:sld xmlns:a="http://schemas.openxmlformats.org/drawingml/2006/main" xmlns:r="http://schemas.openxmlformats.org/officeDocument/2006/relationships" xmlns:p="http://schemas.openxmlformats.org/presentationml/2006/main">
+  <p:cSld>
+    <p:spTree>
+      <p:nvGrpSpPr>
+        <p:cNvPr id="1" name=""/>
+        <p:cNvGrpSpPr/>
+        <p:nvPr/>
+      </p:nvGrpSpPr>
+      <p:grpSpPr>
+        <a:xfrm>
+          <a:off x="0" y="0"/>
+          <a:ext cx="0" cy="0"/>
+          <a:chOff x="0" y="0"/>
+          <a:chExt cx="0" cy="0"/>
+        </a:xfrm>
+      </p:grpSpPr>
+      <p:sp>
+        <p:nvSpPr>
+          <p:cNvPr id="2" name="Title 1">
+            <a:extLst>
+              <a:ext uri="{FF2B5EF4-FFF2-40B4-BE49-F238E27FC236}">
                 <a16:creationId xmlns:a16="http://schemas.microsoft.com/office/drawing/2014/main" id="{08322670-6B4E-4ABF-B392-6FF38EB4FA35}"/>
               </a:ext>
             </a:extLst>
@@ -5928,7 +6401,7 @@
 </p:sld>
 </file>
 
-<file path=ppt/slides/slide16.xml><?xml version="1.0" encoding="utf-8"?>
+<file path=ppt/slides/slide17.xml><?xml version="1.0" encoding="utf-8"?>
 <p:sld xmlns:a="http://schemas.openxmlformats.org/drawingml/2006/main" xmlns:r="http://schemas.openxmlformats.org/officeDocument/2006/relationships" xmlns:p="http://schemas.openxmlformats.org/presentationml/2006/main">
   <p:cSld>
     <p:spTree>
@@ -7343,100 +7816,6 @@
 </p:sld>
 </file>
 
-<file path=ppt/slides/slide17.xml><?xml version="1.0" encoding="utf-8"?>
-<p:sld xmlns:a="http://schemas.openxmlformats.org/drawingml/2006/main" xmlns:r="http://schemas.openxmlformats.org/officeDocument/2006/relationships" xmlns:p="http://schemas.openxmlformats.org/presentationml/2006/main">
-  <p:cSld>
-    <p:spTree>
-      <p:nvGrpSpPr>
-        <p:cNvPr id="1" name=""/>
-        <p:cNvGrpSpPr/>
-        <p:nvPr/>
-      </p:nvGrpSpPr>
-      <p:grpSpPr>
-        <a:xfrm>
-          <a:off x="0" y="0"/>
-          <a:ext cx="0" cy="0"/>
-          <a:chOff x="0" y="0"/>
-          <a:chExt cx="0" cy="0"/>
-        </a:xfrm>
-      </p:grpSpPr>
-      <p:sp>
-        <p:nvSpPr>
-          <p:cNvPr id="2" name="Title 1">
-            <a:extLst>
-              <a:ext uri="{FF2B5EF4-FFF2-40B4-BE49-F238E27FC236}">
-                <a16:creationId xmlns:a16="http://schemas.microsoft.com/office/drawing/2014/main" id="{1FC55AC1-2982-4AF7-BD57-D376A6DD2F99}"/>
-              </a:ext>
-            </a:extLst>
-          </p:cNvPr>
-          <p:cNvSpPr>
-            <a:spLocks noGrp="1"/>
-          </p:cNvSpPr>
-          <p:nvPr>
-            <p:ph type="title"/>
-          </p:nvPr>
-        </p:nvSpPr>
-        <p:spPr/>
-        <p:txBody>
-          <a:bodyPr/>
-          <a:lstStyle/>
-          <a:p>
-            <a:r>
-              <a:rPr lang="en-GB" dirty="0"/>
-              <a:t>Examples: videos</a:t>
-            </a:r>
-          </a:p>
-        </p:txBody>
-      </p:sp>
-      <p:sp>
-        <p:nvSpPr>
-          <p:cNvPr id="3" name="Content Placeholder 2">
-            <a:extLst>
-              <a:ext uri="{FF2B5EF4-FFF2-40B4-BE49-F238E27FC236}">
-                <a16:creationId xmlns:a16="http://schemas.microsoft.com/office/drawing/2014/main" id="{8C2F569E-9C9F-4C25-8469-A56CD94469AC}"/>
-              </a:ext>
-            </a:extLst>
-          </p:cNvPr>
-          <p:cNvSpPr>
-            <a:spLocks noGrp="1"/>
-          </p:cNvSpPr>
-          <p:nvPr>
-            <p:ph idx="1"/>
-          </p:nvPr>
-        </p:nvSpPr>
-        <p:spPr/>
-        <p:txBody>
-          <a:bodyPr/>
-          <a:lstStyle/>
-          <a:p>
-            <a:r>
-              <a:rPr lang="en-GB" dirty="0"/>
-              <a:t>Insert </a:t>
-            </a:r>
-            <a:r>
-              <a:rPr lang="en-GB" dirty="0" err="1"/>
-              <a:t>massmotion</a:t>
-            </a:r>
-            <a:r>
-              <a:rPr lang="en-GB" dirty="0"/>
-              <a:t>, pathfinder, SIMULEX etc</a:t>
-            </a:r>
-          </a:p>
-        </p:txBody>
-      </p:sp>
-    </p:spTree>
-    <p:extLst>
-      <p:ext uri="{BB962C8B-B14F-4D97-AF65-F5344CB8AC3E}">
-        <p14:creationId xmlns:p14="http://schemas.microsoft.com/office/powerpoint/2010/main" val="4219919468"/>
-      </p:ext>
-    </p:extLst>
-  </p:cSld>
-  <p:clrMapOvr>
-    <a:masterClrMapping/>
-  </p:clrMapOvr>
-</p:sld>
-</file>
-
 <file path=ppt/slides/slide18.xml><?xml version="1.0" encoding="utf-8"?>
 <p:sld xmlns:a="http://schemas.openxmlformats.org/drawingml/2006/main" xmlns:r="http://schemas.openxmlformats.org/officeDocument/2006/relationships" xmlns:p="http://schemas.openxmlformats.org/presentationml/2006/main">
   <p:cSld>
@@ -7459,7 +7838,7 @@
           <p:cNvPr id="2" name="Title 1">
             <a:extLst>
               <a:ext uri="{FF2B5EF4-FFF2-40B4-BE49-F238E27FC236}">
-                <a16:creationId xmlns:a16="http://schemas.microsoft.com/office/drawing/2014/main" id="{1A87E17D-8A8C-4127-8A40-80EFE0CE694E}"/>
+                <a16:creationId xmlns:a16="http://schemas.microsoft.com/office/drawing/2014/main" id="{1FC55AC1-2982-4AF7-BD57-D376A6DD2F99}"/>
               </a:ext>
             </a:extLst>
           </p:cNvPr>
@@ -7477,7 +7856,7 @@
           <a:p>
             <a:r>
               <a:rPr lang="en-GB" dirty="0"/>
-              <a:t>So what do we need to know to properly model this?</a:t>
+              <a:t>Examples: videos</a:t>
             </a:r>
           </a:p>
         </p:txBody>
@@ -7487,7 +7866,7 @@
           <p:cNvPr id="3" name="Content Placeholder 2">
             <a:extLst>
               <a:ext uri="{FF2B5EF4-FFF2-40B4-BE49-F238E27FC236}">
-                <a16:creationId xmlns:a16="http://schemas.microsoft.com/office/drawing/2014/main" id="{1BDF774F-DDCA-4F8E-9807-723E6596B889}"/>
+                <a16:creationId xmlns:a16="http://schemas.microsoft.com/office/drawing/2014/main" id="{8C2F569E-9C9F-4C25-8469-A56CD94469AC}"/>
               </a:ext>
             </a:extLst>
           </p:cNvPr>
@@ -7505,48 +7884,23 @@
           <a:p>
             <a:r>
               <a:rPr lang="en-GB" dirty="0"/>
-              <a:t>	Data analysis and generation methods</a:t>
-            </a:r>
-          </a:p>
-          <a:p>
-            <a:r>
-              <a:rPr lang="en-GB" dirty="0"/>
-              <a:t>	Simulation</a:t>
-            </a:r>
-          </a:p>
-          <a:p>
-            <a:r>
-              <a:rPr lang="en-GB" dirty="0"/>
-              <a:t>	Psychology</a:t>
-            </a:r>
-          </a:p>
-          <a:p>
-            <a:r>
-              <a:rPr lang="en-GB" dirty="0"/>
-              <a:t>	Physiology: step length, fitness levels, typical anatomy and morphology. Density estimations.</a:t>
-            </a:r>
-          </a:p>
-          <a:p>
-            <a:r>
-              <a:rPr lang="en-GB" dirty="0"/>
-              <a:t>	Learning and cognitive processes</a:t>
-            </a:r>
-          </a:p>
-          <a:p>
-            <a:r>
-              <a:rPr lang="en-GB" dirty="0"/>
-              <a:t>	Building design and codes</a:t>
-            </a:r>
-          </a:p>
-          <a:p>
-            <a:endParaRPr lang="en-GB" dirty="0"/>
+              <a:t>Insert </a:t>
+            </a:r>
+            <a:r>
+              <a:rPr lang="en-GB" dirty="0" err="1"/>
+              <a:t>massmotion</a:t>
+            </a:r>
+            <a:r>
+              <a:rPr lang="en-GB" dirty="0"/>
+              <a:t>, pathfinder, SIMULEX etc</a:t>
+            </a:r>
           </a:p>
         </p:txBody>
       </p:sp>
     </p:spTree>
     <p:extLst>
       <p:ext uri="{BB962C8B-B14F-4D97-AF65-F5344CB8AC3E}">
-        <p14:creationId xmlns:p14="http://schemas.microsoft.com/office/powerpoint/2010/main" val="2764636776"/>
+        <p14:creationId xmlns:p14="http://schemas.microsoft.com/office/powerpoint/2010/main" val="4219919468"/>
       </p:ext>
     </p:extLst>
   </p:cSld>
@@ -7578,7 +7932,7 @@
           <p:cNvPr id="2" name="Title 1">
             <a:extLst>
               <a:ext uri="{FF2B5EF4-FFF2-40B4-BE49-F238E27FC236}">
-                <a16:creationId xmlns:a16="http://schemas.microsoft.com/office/drawing/2014/main" id="{89CAB9B9-F964-44D6-AEFF-930060E7EFB3}"/>
+                <a16:creationId xmlns:a16="http://schemas.microsoft.com/office/drawing/2014/main" id="{1A87E17D-8A8C-4127-8A40-80EFE0CE694E}"/>
               </a:ext>
             </a:extLst>
           </p:cNvPr>
@@ -7596,7 +7950,7 @@
           <a:p>
             <a:r>
               <a:rPr lang="en-GB" dirty="0"/>
-              <a:t>How can this help?</a:t>
+              <a:t>So what do we need to know to properly model this?</a:t>
             </a:r>
           </a:p>
         </p:txBody>
@@ -7606,7 +7960,7 @@
           <p:cNvPr id="3" name="Content Placeholder 2">
             <a:extLst>
               <a:ext uri="{FF2B5EF4-FFF2-40B4-BE49-F238E27FC236}">
-                <a16:creationId xmlns:a16="http://schemas.microsoft.com/office/drawing/2014/main" id="{23462E2E-F2B0-4BFF-963D-9A3A7874B9AB}"/>
+                <a16:creationId xmlns:a16="http://schemas.microsoft.com/office/drawing/2014/main" id="{1BDF774F-DDCA-4F8E-9807-723E6596B889}"/>
               </a:ext>
             </a:extLst>
           </p:cNvPr>
@@ -7624,35 +7978,48 @@
           <a:p>
             <a:r>
               <a:rPr lang="en-GB" dirty="0"/>
-              <a:t>Influence new designs</a:t>
-            </a:r>
-          </a:p>
-          <a:p>
-            <a:r>
-              <a:rPr lang="en-GB" dirty="0"/>
-              <a:t>Retrofit existing buildings</a:t>
-            </a:r>
-          </a:p>
-          <a:p>
-            <a:r>
-              <a:rPr lang="en-GB" dirty="0"/>
-              <a:t>Support real-time decision making (</a:t>
-            </a:r>
-            <a:r>
-              <a:rPr lang="en-GB" dirty="0" err="1"/>
-              <a:t>esp</a:t>
-            </a:r>
-            <a:r>
-              <a:rPr lang="en-GB" dirty="0"/>
-              <a:t>: emergencies)</a:t>
-            </a:r>
+              <a:t>	Data analysis and generation methods</a:t>
+            </a:r>
+          </a:p>
+          <a:p>
+            <a:r>
+              <a:rPr lang="en-GB" dirty="0"/>
+              <a:t>	Simulation</a:t>
+            </a:r>
+          </a:p>
+          <a:p>
+            <a:r>
+              <a:rPr lang="en-GB" dirty="0"/>
+              <a:t>	Psychology</a:t>
+            </a:r>
+          </a:p>
+          <a:p>
+            <a:r>
+              <a:rPr lang="en-GB" dirty="0"/>
+              <a:t>	Physiology: step length, fitness levels, typical anatomy and morphology. Density estimations.</a:t>
+            </a:r>
+          </a:p>
+          <a:p>
+            <a:r>
+              <a:rPr lang="en-GB" dirty="0"/>
+              <a:t>	Learning and cognitive processes</a:t>
+            </a:r>
+          </a:p>
+          <a:p>
+            <a:r>
+              <a:rPr lang="en-GB" dirty="0"/>
+              <a:t>	Building design and codes</a:t>
+            </a:r>
+          </a:p>
+          <a:p>
+            <a:endParaRPr lang="en-GB" dirty="0"/>
           </a:p>
         </p:txBody>
       </p:sp>
     </p:spTree>
     <p:extLst>
       <p:ext uri="{BB962C8B-B14F-4D97-AF65-F5344CB8AC3E}">
-        <p14:creationId xmlns:p14="http://schemas.microsoft.com/office/powerpoint/2010/main" val="4140933311"/>
+        <p14:creationId xmlns:p14="http://schemas.microsoft.com/office/powerpoint/2010/main" val="2764636776"/>
       </p:ext>
     </p:extLst>
   </p:cSld>
@@ -7791,7 +8158,7 @@
           <p:cNvPr id="2" name="Title 1">
             <a:extLst>
               <a:ext uri="{FF2B5EF4-FFF2-40B4-BE49-F238E27FC236}">
-                <a16:creationId xmlns:a16="http://schemas.microsoft.com/office/drawing/2014/main" id="{BDF5B6FC-CBCC-4432-AD50-47E5E0C05C03}"/>
+                <a16:creationId xmlns:a16="http://schemas.microsoft.com/office/drawing/2014/main" id="{89CAB9B9-F964-44D6-AEFF-930060E7EFB3}"/>
               </a:ext>
             </a:extLst>
           </p:cNvPr>
@@ -7809,7 +8176,7 @@
           <a:p>
             <a:r>
               <a:rPr lang="en-GB" dirty="0"/>
-              <a:t>Workshop: build fundamental diagram</a:t>
+              <a:t>How can this help?</a:t>
             </a:r>
           </a:p>
         </p:txBody>
@@ -7819,7 +8186,7 @@
           <p:cNvPr id="3" name="Content Placeholder 2">
             <a:extLst>
               <a:ext uri="{FF2B5EF4-FFF2-40B4-BE49-F238E27FC236}">
-                <a16:creationId xmlns:a16="http://schemas.microsoft.com/office/drawing/2014/main" id="{66D1EE25-E5C1-40ED-9CA5-21D45BF3E2E6}"/>
+                <a16:creationId xmlns:a16="http://schemas.microsoft.com/office/drawing/2014/main" id="{23462E2E-F2B0-4BFF-963D-9A3A7874B9AB}"/>
               </a:ext>
             </a:extLst>
           </p:cNvPr>
@@ -7835,14 +8202,39 @@
           <a:bodyPr/>
           <a:lstStyle/>
           <a:p>
+            <a:r>
+              <a:rPr lang="en-GB" dirty="0"/>
+              <a:t>Influence new designs</a:t>
+            </a:r>
+          </a:p>
+          <a:p>
             <a:endParaRPr lang="en-GB" dirty="0"/>
+          </a:p>
+          <a:p>
+            <a:r>
+              <a:rPr lang="en-GB" dirty="0"/>
+              <a:t>Retrofit </a:t>
+            </a:r>
+            <a:r>
+              <a:rPr lang="en-GB"/>
+              <a:t>existing buildings</a:t>
+            </a:r>
+          </a:p>
+          <a:p>
+            <a:endParaRPr lang="en-GB" dirty="0"/>
+          </a:p>
+          <a:p>
+            <a:r>
+              <a:rPr lang="en-GB" dirty="0"/>
+              <a:t>Support real-time decision making (especially in emergencies)</a:t>
+            </a:r>
           </a:p>
         </p:txBody>
       </p:sp>
     </p:spTree>
     <p:extLst>
       <p:ext uri="{BB962C8B-B14F-4D97-AF65-F5344CB8AC3E}">
-        <p14:creationId xmlns:p14="http://schemas.microsoft.com/office/powerpoint/2010/main" val="835170155"/>
+        <p14:creationId xmlns:p14="http://schemas.microsoft.com/office/powerpoint/2010/main" val="4140933311"/>
       </p:ext>
     </p:extLst>
   </p:cSld>
@@ -7874,7 +8266,7 @@
           <p:cNvPr id="2" name="Title 1">
             <a:extLst>
               <a:ext uri="{FF2B5EF4-FFF2-40B4-BE49-F238E27FC236}">
-                <a16:creationId xmlns:a16="http://schemas.microsoft.com/office/drawing/2014/main" id="{207FCBCD-BDD8-4EAF-9C69-0E66E14359AC}"/>
+                <a16:creationId xmlns:a16="http://schemas.microsoft.com/office/drawing/2014/main" id="{BDF5B6FC-CBCC-4432-AD50-47E5E0C05C03}"/>
               </a:ext>
             </a:extLst>
           </p:cNvPr>
@@ -7892,7 +8284,7 @@
           <a:p>
             <a:r>
               <a:rPr lang="en-GB" dirty="0"/>
-              <a:t>Workshop: Hydraulic model</a:t>
+              <a:t>Workshop: build fundamental diagram</a:t>
             </a:r>
           </a:p>
         </p:txBody>
@@ -7902,7 +8294,7 @@
           <p:cNvPr id="3" name="Content Placeholder 2">
             <a:extLst>
               <a:ext uri="{FF2B5EF4-FFF2-40B4-BE49-F238E27FC236}">
-                <a16:creationId xmlns:a16="http://schemas.microsoft.com/office/drawing/2014/main" id="{B2D4783A-B212-4876-B12A-96088A92E08E}"/>
+                <a16:creationId xmlns:a16="http://schemas.microsoft.com/office/drawing/2014/main" id="{66D1EE25-E5C1-40ED-9CA5-21D45BF3E2E6}"/>
               </a:ext>
             </a:extLst>
           </p:cNvPr>
@@ -7919,49 +8311,14 @@
           <a:lstStyle/>
           <a:p>
             <a:r>
-              <a:rPr lang="en-GB" dirty="0" err="1"/>
-              <a:t>Skempton</a:t>
-            </a:r>
-            <a:r>
-              <a:rPr lang="en-GB" dirty="0"/>
-              <a:t> building. How long does it take for this room to evacuate the building?</a:t>
-            </a:r>
-          </a:p>
-          <a:p>
-            <a:r>
-              <a:rPr lang="en-GB" dirty="0"/>
-              <a:t>Assumptions: </a:t>
-            </a:r>
-          </a:p>
-          <a:p>
-            <a:pPr lvl="1"/>
-            <a:r>
-              <a:rPr lang="en-GB" dirty="0"/>
-              <a:t>Rest of the building is empty</a:t>
-            </a:r>
-          </a:p>
-          <a:p>
-            <a:pPr lvl="1"/>
-            <a:r>
-              <a:rPr lang="en-GB" dirty="0"/>
-              <a:t>All room occupants follow the same, shortest path</a:t>
-            </a:r>
-          </a:p>
-          <a:p>
-            <a:pPr lvl="1"/>
-            <a:r>
-              <a:rPr lang="en-GB" dirty="0"/>
-              <a:t>All occupants follow standard speed/flow/density relationships</a:t>
-            </a:r>
-          </a:p>
-          <a:p>
-            <a:pPr lvl="1"/>
-            <a:endParaRPr lang="en-GB" dirty="0"/>
-          </a:p>
-          <a:p>
-            <a:r>
-              <a:rPr lang="en-GB" dirty="0"/>
-              <a:t>45 minutes, work in groups, present answers for 15 minutes.</a:t>
+              <a:rPr lang="en-GB" dirty="0"/>
+              <a:t>Rope circle: 2m^2</a:t>
+            </a:r>
+          </a:p>
+          <a:p>
+            <a:r>
+              <a:rPr lang="en-GB" dirty="0"/>
+              <a:t>3-8 people</a:t>
             </a:r>
           </a:p>
         </p:txBody>
@@ -7969,7 +8326,7 @@
     </p:spTree>
     <p:extLst>
       <p:ext uri="{BB962C8B-B14F-4D97-AF65-F5344CB8AC3E}">
-        <p14:creationId xmlns:p14="http://schemas.microsoft.com/office/powerpoint/2010/main" val="1694227799"/>
+        <p14:creationId xmlns:p14="http://schemas.microsoft.com/office/powerpoint/2010/main" val="835170155"/>
       </p:ext>
     </p:extLst>
   </p:cSld>
@@ -8001,7 +8358,7 @@
           <p:cNvPr id="2" name="Title 1">
             <a:extLst>
               <a:ext uri="{FF2B5EF4-FFF2-40B4-BE49-F238E27FC236}">
-                <a16:creationId xmlns:a16="http://schemas.microsoft.com/office/drawing/2014/main" id="{7EBCCDF9-A1E2-4143-A11E-28A4E0526A8B}"/>
+                <a16:creationId xmlns:a16="http://schemas.microsoft.com/office/drawing/2014/main" id="{207FCBCD-BDD8-4EAF-9C69-0E66E14359AC}"/>
               </a:ext>
             </a:extLst>
           </p:cNvPr>
@@ -8018,63 +8375,85 @@
           <a:lstStyle/>
           <a:p>
             <a:r>
+              <a:rPr lang="en-GB" dirty="0"/>
+              <a:t>Workshop: Hydraulic model</a:t>
+            </a:r>
+          </a:p>
+        </p:txBody>
+      </p:sp>
+      <p:sp>
+        <p:nvSpPr>
+          <p:cNvPr id="3" name="Content Placeholder 2">
+            <a:extLst>
+              <a:ext uri="{FF2B5EF4-FFF2-40B4-BE49-F238E27FC236}">
+                <a16:creationId xmlns:a16="http://schemas.microsoft.com/office/drawing/2014/main" id="{B2D4783A-B212-4876-B12A-96088A92E08E}"/>
+              </a:ext>
+            </a:extLst>
+          </p:cNvPr>
+          <p:cNvSpPr>
+            <a:spLocks noGrp="1"/>
+          </p:cNvSpPr>
+          <p:nvPr>
+            <p:ph idx="1"/>
+          </p:nvPr>
+        </p:nvSpPr>
+        <p:spPr/>
+        <p:txBody>
+          <a:bodyPr/>
+          <a:lstStyle/>
+          <a:p>
+            <a:r>
               <a:rPr lang="en-GB" dirty="0" err="1"/>
-              <a:t>Mentimeter</a:t>
-            </a:r>
-            <a:r>
-              <a:rPr lang="en-GB" dirty="0"/>
-              <a:t> poll</a:t>
-            </a:r>
-          </a:p>
-        </p:txBody>
-      </p:sp>
-      <p:sp>
-        <p:nvSpPr>
-          <p:cNvPr id="3" name="Content Placeholder 2">
-            <a:extLst>
-              <a:ext uri="{FF2B5EF4-FFF2-40B4-BE49-F238E27FC236}">
-                <a16:creationId xmlns:a16="http://schemas.microsoft.com/office/drawing/2014/main" id="{1B921DBF-5B75-449F-B43A-0A93285800EE}"/>
-              </a:ext>
-            </a:extLst>
-          </p:cNvPr>
-          <p:cNvSpPr>
-            <a:spLocks noGrp="1"/>
-          </p:cNvSpPr>
-          <p:nvPr>
-            <p:ph idx="1"/>
-          </p:nvPr>
-        </p:nvSpPr>
-        <p:spPr/>
-        <p:txBody>
-          <a:bodyPr/>
-          <a:lstStyle/>
-          <a:p>
-            <a:r>
-              <a:rPr lang="en-GB" dirty="0"/>
-              <a:t>The hydraulic model can accommodate different demographic characteristics: TRUE/FALSE</a:t>
-            </a:r>
-          </a:p>
-          <a:p>
-            <a:r>
-              <a:rPr lang="en-GB" dirty="0"/>
-              <a:t>The hydraulic model is an agent based model: TRUE/FALSE</a:t>
-            </a:r>
-          </a:p>
-          <a:p>
-            <a:r>
-              <a:rPr lang="en-GB" dirty="0"/>
-              <a:t>I want to look at the evacuation of a city, what type of model should I use: MACRO/MICRO/MESO</a:t>
-            </a:r>
-          </a:p>
-          <a:p>
+              <a:t>Skempton</a:t>
+            </a:r>
+            <a:r>
+              <a:rPr lang="en-GB" dirty="0"/>
+              <a:t> building. How long does it take for this room to evacuate the building?</a:t>
+            </a:r>
+          </a:p>
+          <a:p>
+            <a:r>
+              <a:rPr lang="en-GB" dirty="0"/>
+              <a:t>Assumptions: </a:t>
+            </a:r>
+          </a:p>
+          <a:p>
+            <a:pPr lvl="1"/>
+            <a:r>
+              <a:rPr lang="en-GB" dirty="0"/>
+              <a:t>Rest of the building is empty</a:t>
+            </a:r>
+          </a:p>
+          <a:p>
+            <a:pPr lvl="1"/>
+            <a:r>
+              <a:rPr lang="en-GB" dirty="0"/>
+              <a:t>All room occupants follow the same, shortest path</a:t>
+            </a:r>
+          </a:p>
+          <a:p>
+            <a:pPr lvl="1"/>
+            <a:r>
+              <a:rPr lang="en-GB" dirty="0"/>
+              <a:t>All occupants follow standard speed/flow/density relationships</a:t>
+            </a:r>
+          </a:p>
+          <a:p>
+            <a:pPr lvl="1"/>
             <a:endParaRPr lang="en-GB" dirty="0"/>
+          </a:p>
+          <a:p>
+            <a:r>
+              <a:rPr lang="en-GB" dirty="0"/>
+              <a:t>45 minutes, work in groups, present answers for 15 minutes.</a:t>
+            </a:r>
           </a:p>
         </p:txBody>
       </p:sp>
     </p:spTree>
     <p:extLst>
       <p:ext uri="{BB962C8B-B14F-4D97-AF65-F5344CB8AC3E}">
-        <p14:creationId xmlns:p14="http://schemas.microsoft.com/office/powerpoint/2010/main" val="3512911443"/>
+        <p14:creationId xmlns:p14="http://schemas.microsoft.com/office/powerpoint/2010/main" val="1694227799"/>
       </p:ext>
     </p:extLst>
   </p:cSld>
@@ -8106,7 +8485,7 @@
           <p:cNvPr id="2" name="Title 1">
             <a:extLst>
               <a:ext uri="{FF2B5EF4-FFF2-40B4-BE49-F238E27FC236}">
-                <a16:creationId xmlns:a16="http://schemas.microsoft.com/office/drawing/2014/main" id="{29744FCE-15D3-49EC-AB0B-8B3BBFBCFD39}"/>
+                <a16:creationId xmlns:a16="http://schemas.microsoft.com/office/drawing/2014/main" id="{7EBCCDF9-A1E2-4143-A11E-28A4E0526A8B}"/>
               </a:ext>
             </a:extLst>
           </p:cNvPr>
@@ -8121,56 +8500,6 @@
         <p:txBody>
           <a:bodyPr/>
           <a:lstStyle/>
-          <a:p>
-            <a:r>
-              <a:rPr lang="en-GB" dirty="0"/>
-              <a:t>Intro to remainder of course</a:t>
-            </a:r>
-          </a:p>
-        </p:txBody>
-      </p:sp>
-      <p:sp>
-        <p:nvSpPr>
-          <p:cNvPr id="3" name="Content Placeholder 2">
-            <a:extLst>
-              <a:ext uri="{FF2B5EF4-FFF2-40B4-BE49-F238E27FC236}">
-                <a16:creationId xmlns:a16="http://schemas.microsoft.com/office/drawing/2014/main" id="{AE054828-0457-47BF-BE8A-76FB2074FD59}"/>
-              </a:ext>
-            </a:extLst>
-          </p:cNvPr>
-          <p:cNvSpPr>
-            <a:spLocks noGrp="1"/>
-          </p:cNvSpPr>
-          <p:nvPr>
-            <p:ph idx="1"/>
-          </p:nvPr>
-        </p:nvSpPr>
-        <p:spPr/>
-        <p:txBody>
-          <a:bodyPr>
-            <a:normAutofit lnSpcReduction="10000"/>
-          </a:bodyPr>
-          <a:lstStyle/>
-          <a:p>
-            <a:r>
-              <a:rPr lang="en-GB" dirty="0"/>
-              <a:t>Flipped approach.</a:t>
-            </a:r>
-          </a:p>
-          <a:p>
-            <a:pPr lvl="1"/>
-            <a:r>
-              <a:rPr lang="en-GB" dirty="0"/>
-              <a:t>We will be releasing videos on blackboard. You need to watch these before turning up to the class.</a:t>
-            </a:r>
-          </a:p>
-          <a:p>
-            <a:pPr lvl="1"/>
-            <a:r>
-              <a:rPr lang="en-GB" dirty="0"/>
-              <a:t>The classes will be workshops aimed at supporting the lecture material.</a:t>
-            </a:r>
-          </a:p>
           <a:p>
             <a:r>
               <a:rPr lang="en-GB" dirty="0" err="1"/>
@@ -8178,20 +8507,186 @@
             </a:r>
             <a:r>
               <a:rPr lang="en-GB" dirty="0"/>
-              <a:t> polls</a:t>
+              <a:t> poll</a:t>
+            </a:r>
+          </a:p>
+        </p:txBody>
+      </p:sp>
+      <p:sp>
+        <p:nvSpPr>
+          <p:cNvPr id="3" name="Content Placeholder 2">
+            <a:extLst>
+              <a:ext uri="{FF2B5EF4-FFF2-40B4-BE49-F238E27FC236}">
+                <a16:creationId xmlns:a16="http://schemas.microsoft.com/office/drawing/2014/main" id="{1B921DBF-5B75-449F-B43A-0A93285800EE}"/>
+              </a:ext>
+            </a:extLst>
+          </p:cNvPr>
+          <p:cNvSpPr>
+            <a:spLocks noGrp="1"/>
+          </p:cNvSpPr>
+          <p:nvPr>
+            <p:ph idx="1"/>
+          </p:nvPr>
+        </p:nvSpPr>
+        <p:spPr/>
+        <p:txBody>
+          <a:bodyPr/>
+          <a:lstStyle/>
+          <a:p>
+            <a:r>
+              <a:rPr lang="en-GB" dirty="0"/>
+              <a:t>The hydraulic model can accommodate different demographic characteristics: TRUE/FALSE</a:t>
+            </a:r>
+          </a:p>
+          <a:p>
+            <a:r>
+              <a:rPr lang="en-GB" dirty="0"/>
+              <a:t>The hydraulic model is an agent based model: TRUE/FALSE</a:t>
+            </a:r>
+          </a:p>
+          <a:p>
+            <a:r>
+              <a:rPr lang="en-GB" dirty="0"/>
+              <a:t>I want to look at the evacuation of a city, what type of model should I use: MACRO/MICRO/MESO</a:t>
+            </a:r>
+          </a:p>
+          <a:p>
+            <a:endParaRPr lang="en-GB" dirty="0"/>
+          </a:p>
+        </p:txBody>
+      </p:sp>
+    </p:spTree>
+    <p:extLst>
+      <p:ext uri="{BB962C8B-B14F-4D97-AF65-F5344CB8AC3E}">
+        <p14:creationId xmlns:p14="http://schemas.microsoft.com/office/powerpoint/2010/main" val="3512911443"/>
+      </p:ext>
+    </p:extLst>
+  </p:cSld>
+  <p:clrMapOvr>
+    <a:masterClrMapping/>
+  </p:clrMapOvr>
+</p:sld>
+</file>
+
+<file path=ppt/slides/slide24.xml><?xml version="1.0" encoding="utf-8"?>
+<p:sld xmlns:a="http://schemas.openxmlformats.org/drawingml/2006/main" xmlns:r="http://schemas.openxmlformats.org/officeDocument/2006/relationships" xmlns:p="http://schemas.openxmlformats.org/presentationml/2006/main">
+  <p:cSld>
+    <p:spTree>
+      <p:nvGrpSpPr>
+        <p:cNvPr id="1" name=""/>
+        <p:cNvGrpSpPr/>
+        <p:nvPr/>
+      </p:nvGrpSpPr>
+      <p:grpSpPr>
+        <a:xfrm>
+          <a:off x="0" y="0"/>
+          <a:ext cx="0" cy="0"/>
+          <a:chOff x="0" y="0"/>
+          <a:chExt cx="0" cy="0"/>
+        </a:xfrm>
+      </p:grpSpPr>
+      <p:sp>
+        <p:nvSpPr>
+          <p:cNvPr id="2" name="Title 1">
+            <a:extLst>
+              <a:ext uri="{FF2B5EF4-FFF2-40B4-BE49-F238E27FC236}">
+                <a16:creationId xmlns:a16="http://schemas.microsoft.com/office/drawing/2014/main" id="{29744FCE-15D3-49EC-AB0B-8B3BBFBCFD39}"/>
+              </a:ext>
+            </a:extLst>
+          </p:cNvPr>
+          <p:cNvSpPr>
+            <a:spLocks noGrp="1"/>
+          </p:cNvSpPr>
+          <p:nvPr>
+            <p:ph type="title"/>
+          </p:nvPr>
+        </p:nvSpPr>
+        <p:spPr/>
+        <p:txBody>
+          <a:bodyPr/>
+          <a:lstStyle/>
+          <a:p>
+            <a:r>
+              <a:rPr lang="en-GB" dirty="0"/>
+              <a:t>Intro to remainder of course</a:t>
+            </a:r>
+          </a:p>
+        </p:txBody>
+      </p:sp>
+      <p:sp>
+        <p:nvSpPr>
+          <p:cNvPr id="3" name="Content Placeholder 2">
+            <a:extLst>
+              <a:ext uri="{FF2B5EF4-FFF2-40B4-BE49-F238E27FC236}">
+                <a16:creationId xmlns:a16="http://schemas.microsoft.com/office/drawing/2014/main" id="{AE054828-0457-47BF-BE8A-76FB2074FD59}"/>
+              </a:ext>
+            </a:extLst>
+          </p:cNvPr>
+          <p:cNvSpPr>
+            <a:spLocks noGrp="1"/>
+          </p:cNvSpPr>
+          <p:nvPr>
+            <p:ph idx="1"/>
+          </p:nvPr>
+        </p:nvSpPr>
+        <p:spPr/>
+        <p:txBody>
+          <a:bodyPr>
+            <a:normAutofit/>
+          </a:bodyPr>
+          <a:lstStyle/>
+          <a:p>
+            <a:r>
+              <a:rPr lang="en-GB" dirty="0"/>
+              <a:t>Flipped approach</a:t>
             </a:r>
           </a:p>
           <a:p>
             <a:pPr lvl="1"/>
             <a:r>
               <a:rPr lang="en-GB" dirty="0"/>
-              <a:t>These will be performed at the beginning of the classes. </a:t>
+              <a:t>Online lectures</a:t>
+            </a:r>
+          </a:p>
+          <a:p>
+            <a:pPr lvl="2"/>
+            <a:r>
+              <a:rPr lang="en-GB" dirty="0"/>
+              <a:t>We will be releasing videos on blackboard. You need to watch these before turning up to the class</a:t>
             </a:r>
           </a:p>
           <a:p>
             <a:pPr lvl="1"/>
             <a:r>
               <a:rPr lang="en-GB" dirty="0"/>
+              <a:t>Workshops</a:t>
+            </a:r>
+          </a:p>
+          <a:p>
+            <a:pPr lvl="2"/>
+            <a:r>
+              <a:rPr lang="en-GB" dirty="0"/>
+              <a:t>Hand-on learning and practice of lecture material</a:t>
+            </a:r>
+          </a:p>
+          <a:p>
+            <a:pPr lvl="2"/>
+            <a:endParaRPr lang="en-GB" dirty="0"/>
+          </a:p>
+          <a:p>
+            <a:r>
+              <a:rPr lang="en-GB" dirty="0" err="1"/>
+              <a:t>Mentimeter</a:t>
+            </a:r>
+            <a:r>
+              <a:rPr lang="en-GB" dirty="0"/>
+              <a:t> quizzes</a:t>
+            </a:r>
+          </a:p>
+          <a:p>
+            <a:pPr lvl="1"/>
+            <a:r>
+              <a:rPr lang="en-GB" dirty="0"/>
               <a:t>They will cover the work done in the previous workshop, as well as the lectures you have watched.</a:t>
             </a:r>
           </a:p>
@@ -8199,20 +8694,7 @@
             <a:pPr lvl="1"/>
             <a:r>
               <a:rPr lang="en-GB" dirty="0"/>
-              <a:t>They will form part of your coursework mark</a:t>
-            </a:r>
-          </a:p>
-          <a:p>
-            <a:r>
-              <a:rPr lang="en-GB" dirty="0"/>
-              <a:t>BB assessments.</a:t>
-            </a:r>
-          </a:p>
-          <a:p>
-            <a:pPr lvl="1"/>
-            <a:r>
-              <a:rPr lang="en-GB" dirty="0"/>
-              <a:t>They will be performed </a:t>
+              <a:t>They will form part of your coursework mark.</a:t>
             </a:r>
           </a:p>
         </p:txBody>

</xml_diff>